<commit_message>
Added min leverage plot and modified poster
</commit_message>
<xml_diff>
--- a/poster.pptx
+++ b/poster.pptx
@@ -11,7 +11,7 @@
     <p:sldId id="306" r:id="rId2"/>
   </p:sldIdLst>
   <p:sldSz cx="49377600" cy="32918400"/>
-  <p:notesSz cx="6858000" cy="9144000"/>
+  <p:notesSz cx="9931400" cy="14351000"/>
   <p:embeddedFontLst>
     <p:embeddedFont>
       <p:font typeface="Lato" panose="020F0502020204030203" pitchFamily="34" charset="0"/>
@@ -3422,18 +3422,18 @@
         </p:nvSpPr>
         <p:spPr>
           <a:xfrm>
-            <a:off x="0" y="0"/>
-            <a:ext cx="2971800" cy="458788"/>
+            <a:off x="2" y="2"/>
+            <a:ext cx="4303606" cy="720043"/>
           </a:xfrm>
           <a:prstGeom prst="rect">
             <a:avLst/>
           </a:prstGeom>
         </p:spPr>
         <p:txBody>
-          <a:bodyPr vert="horz" lIns="91440" tIns="45720" rIns="91440" bIns="45720" rtlCol="0"/>
+          <a:bodyPr vert="horz" lIns="132733" tIns="66367" rIns="132733" bIns="66367" rtlCol="0"/>
           <a:lstStyle>
             <a:lvl1pPr algn="l">
-              <a:defRPr sz="1200"/>
+              <a:defRPr sz="1700"/>
             </a:lvl1pPr>
           </a:lstStyle>
           <a:p>
@@ -3453,24 +3453,24 @@
         </p:nvSpPr>
         <p:spPr>
           <a:xfrm>
-            <a:off x="3884613" y="0"/>
-            <a:ext cx="2971800" cy="458788"/>
+            <a:off x="5625498" y="2"/>
+            <a:ext cx="4303606" cy="720043"/>
           </a:xfrm>
           <a:prstGeom prst="rect">
             <a:avLst/>
           </a:prstGeom>
         </p:spPr>
         <p:txBody>
-          <a:bodyPr vert="horz" lIns="91440" tIns="45720" rIns="91440" bIns="45720" rtlCol="0"/>
+          <a:bodyPr vert="horz" lIns="132733" tIns="66367" rIns="132733" bIns="66367" rtlCol="0"/>
           <a:lstStyle>
             <a:lvl1pPr algn="r">
-              <a:defRPr sz="1200"/>
+              <a:defRPr sz="1700"/>
             </a:lvl1pPr>
           </a:lstStyle>
           <a:p>
             <a:fld id="{BD1CB04D-1C75-43E0-9B64-B7DDAA42BB2C}" type="datetimeFigureOut">
               <a:rPr lang="en-US" smtClean="0"/>
-              <a:t>3/28/2025</a:t>
+              <a:t>4/1/2025</a:t>
             </a:fld>
             <a:endParaRPr lang="en-US"/>
           </a:p>
@@ -3488,8 +3488,8 @@
         </p:nvSpPr>
         <p:spPr>
           <a:xfrm>
-            <a:off x="1114425" y="1143000"/>
-            <a:ext cx="4629150" cy="3086100"/>
+            <a:off x="1333500" y="1793875"/>
+            <a:ext cx="7264400" cy="4841875"/>
           </a:xfrm>
           <a:prstGeom prst="rect">
             <a:avLst/>
@@ -3502,7 +3502,7 @@
           </a:ln>
         </p:spPr>
         <p:txBody>
-          <a:bodyPr vert="horz" lIns="91440" tIns="45720" rIns="91440" bIns="45720" rtlCol="0" anchor="ctr"/>
+          <a:bodyPr vert="horz" lIns="132733" tIns="66367" rIns="132733" bIns="66367" rtlCol="0" anchor="ctr"/>
           <a:lstStyle/>
           <a:p>
             <a:endParaRPr lang="en-US"/>
@@ -3521,15 +3521,15 @@
         </p:nvSpPr>
         <p:spPr>
           <a:xfrm>
-            <a:off x="685800" y="4400550"/>
-            <a:ext cx="5486400" cy="3600450"/>
+            <a:off x="993140" y="6906420"/>
+            <a:ext cx="7945120" cy="5650707"/>
           </a:xfrm>
           <a:prstGeom prst="rect">
             <a:avLst/>
           </a:prstGeom>
         </p:spPr>
         <p:txBody>
-          <a:bodyPr vert="horz" lIns="91440" tIns="45720" rIns="91440" bIns="45720" rtlCol="0"/>
+          <a:bodyPr vert="horz" lIns="132733" tIns="66367" rIns="132733" bIns="66367" rtlCol="0"/>
           <a:lstStyle/>
           <a:p>
             <a:pPr lvl="0"/>
@@ -3580,18 +3580,18 @@
         </p:nvSpPr>
         <p:spPr>
           <a:xfrm>
-            <a:off x="0" y="8685213"/>
-            <a:ext cx="2971800" cy="458787"/>
+            <a:off x="2" y="13630960"/>
+            <a:ext cx="4303606" cy="720041"/>
           </a:xfrm>
           <a:prstGeom prst="rect">
             <a:avLst/>
           </a:prstGeom>
         </p:spPr>
         <p:txBody>
-          <a:bodyPr vert="horz" lIns="91440" tIns="45720" rIns="91440" bIns="45720" rtlCol="0" anchor="b"/>
+          <a:bodyPr vert="horz" lIns="132733" tIns="66367" rIns="132733" bIns="66367" rtlCol="0" anchor="b"/>
           <a:lstStyle>
             <a:lvl1pPr algn="l">
-              <a:defRPr sz="1200"/>
+              <a:defRPr sz="1700"/>
             </a:lvl1pPr>
           </a:lstStyle>
           <a:p>
@@ -3611,18 +3611,18 @@
         </p:nvSpPr>
         <p:spPr>
           <a:xfrm>
-            <a:off x="3884613" y="8685213"/>
-            <a:ext cx="2971800" cy="458787"/>
+            <a:off x="5625498" y="13630960"/>
+            <a:ext cx="4303606" cy="720041"/>
           </a:xfrm>
           <a:prstGeom prst="rect">
             <a:avLst/>
           </a:prstGeom>
         </p:spPr>
         <p:txBody>
-          <a:bodyPr vert="horz" lIns="91440" tIns="45720" rIns="91440" bIns="45720" rtlCol="0" anchor="b"/>
+          <a:bodyPr vert="horz" lIns="132733" tIns="66367" rIns="132733" bIns="66367" rtlCol="0" anchor="b"/>
           <a:lstStyle>
             <a:lvl1pPr algn="r">
-              <a:defRPr sz="1200"/>
+              <a:defRPr sz="1700"/>
             </a:lvl1pPr>
           </a:lstStyle>
           <a:p>
@@ -3787,7 +3787,7 @@
             </a:r>
           </a:p>
           <a:p>
-            <a:pPr marL="171450" indent="-171450">
+            <a:pPr marL="248877" indent="-248877">
               <a:buFont typeface="Arial" panose="020B0604020202020204" pitchFamily="34" charset="0"/>
               <a:buChar char="•"/>
             </a:pPr>
@@ -3805,7 +3805,7 @@
             </a:r>
           </a:p>
           <a:p>
-            <a:pPr marL="171450" indent="-171450">
+            <a:pPr marL="248877" indent="-248877">
               <a:buFont typeface="Arial" panose="020B0604020202020204" pitchFamily="34" charset="0"/>
               <a:buChar char="•"/>
             </a:pPr>
@@ -3815,7 +3815,7 @@
             </a:r>
           </a:p>
           <a:p>
-            <a:pPr marL="171450" indent="-171450">
+            <a:pPr marL="248877" indent="-248877">
               <a:buFont typeface="Arial" panose="020B0604020202020204" pitchFamily="34" charset="0"/>
               <a:buChar char="•"/>
             </a:pPr>
@@ -3833,7 +3833,7 @@
             </a:r>
           </a:p>
           <a:p>
-            <a:pPr marL="171450" indent="-171450">
+            <a:pPr marL="248877" indent="-248877">
               <a:buFont typeface="Arial" panose="020B0604020202020204" pitchFamily="34" charset="0"/>
               <a:buChar char="•"/>
             </a:pPr>
@@ -3851,7 +3851,7 @@
             </a:r>
           </a:p>
           <a:p>
-            <a:pPr marL="171450" indent="-171450">
+            <a:pPr marL="248877" indent="-248877">
               <a:buFont typeface="Arial" panose="020B0604020202020204" pitchFamily="34" charset="0"/>
               <a:buChar char="•"/>
             </a:pPr>
@@ -3861,10 +3861,6 @@
             </a:r>
           </a:p>
           <a:p>
-            <a:pPr marL="0" indent="0">
-              <a:buFont typeface="Arial" panose="020B0604020202020204" pitchFamily="34" charset="0"/>
-              <a:buNone/>
-            </a:pPr>
             <a:endParaRPr lang="en-US" dirty="0"/>
           </a:p>
         </p:txBody>
@@ -4036,7 +4032,7 @@
           <a:p>
             <a:fld id="{3F135061-2F74-46D4-9F8F-C77EF304855D}" type="datetimeFigureOut">
               <a:rPr lang="en-US" smtClean="0"/>
-              <a:t>3/28/2025</a:t>
+              <a:t>4/1/2025</a:t>
             </a:fld>
             <a:endParaRPr lang="en-US"/>
           </a:p>
@@ -4206,7 +4202,7 @@
           <a:p>
             <a:fld id="{3F135061-2F74-46D4-9F8F-C77EF304855D}" type="datetimeFigureOut">
               <a:rPr lang="en-US" smtClean="0"/>
-              <a:t>3/28/2025</a:t>
+              <a:t>4/1/2025</a:t>
             </a:fld>
             <a:endParaRPr lang="en-US"/>
           </a:p>
@@ -4386,7 +4382,7 @@
           <a:p>
             <a:fld id="{3F135061-2F74-46D4-9F8F-C77EF304855D}" type="datetimeFigureOut">
               <a:rPr lang="en-US" smtClean="0"/>
-              <a:t>3/28/2025</a:t>
+              <a:t>4/1/2025</a:t>
             </a:fld>
             <a:endParaRPr lang="en-US"/>
           </a:p>
@@ -4556,7 +4552,7 @@
           <a:p>
             <a:fld id="{3F135061-2F74-46D4-9F8F-C77EF304855D}" type="datetimeFigureOut">
               <a:rPr lang="en-US" smtClean="0"/>
-              <a:t>3/28/2025</a:t>
+              <a:t>4/1/2025</a:t>
             </a:fld>
             <a:endParaRPr lang="en-US"/>
           </a:p>
@@ -4800,7 +4796,7 @@
           <a:p>
             <a:fld id="{3F135061-2F74-46D4-9F8F-C77EF304855D}" type="datetimeFigureOut">
               <a:rPr lang="en-US" smtClean="0"/>
-              <a:t>3/28/2025</a:t>
+              <a:t>4/1/2025</a:t>
             </a:fld>
             <a:endParaRPr lang="en-US"/>
           </a:p>
@@ -5032,7 +5028,7 @@
           <a:p>
             <a:fld id="{3F135061-2F74-46D4-9F8F-C77EF304855D}" type="datetimeFigureOut">
               <a:rPr lang="en-US" smtClean="0"/>
-              <a:t>3/28/2025</a:t>
+              <a:t>4/1/2025</a:t>
             </a:fld>
             <a:endParaRPr lang="en-US"/>
           </a:p>
@@ -5399,7 +5395,7 @@
           <a:p>
             <a:fld id="{3F135061-2F74-46D4-9F8F-C77EF304855D}" type="datetimeFigureOut">
               <a:rPr lang="en-US" smtClean="0"/>
-              <a:t>3/28/2025</a:t>
+              <a:t>4/1/2025</a:t>
             </a:fld>
             <a:endParaRPr lang="en-US"/>
           </a:p>
@@ -5517,7 +5513,7 @@
           <a:p>
             <a:fld id="{3F135061-2F74-46D4-9F8F-C77EF304855D}" type="datetimeFigureOut">
               <a:rPr lang="en-US" smtClean="0"/>
-              <a:t>3/28/2025</a:t>
+              <a:t>4/1/2025</a:t>
             </a:fld>
             <a:endParaRPr lang="en-US"/>
           </a:p>
@@ -5612,7 +5608,7 @@
           <a:p>
             <a:fld id="{3F135061-2F74-46D4-9F8F-C77EF304855D}" type="datetimeFigureOut">
               <a:rPr lang="en-US" smtClean="0"/>
-              <a:t>3/28/2025</a:t>
+              <a:t>4/1/2025</a:t>
             </a:fld>
             <a:endParaRPr lang="en-US"/>
           </a:p>
@@ -5889,7 +5885,7 @@
           <a:p>
             <a:fld id="{3F135061-2F74-46D4-9F8F-C77EF304855D}" type="datetimeFigureOut">
               <a:rPr lang="en-US" smtClean="0"/>
-              <a:t>3/28/2025</a:t>
+              <a:t>4/1/2025</a:t>
             </a:fld>
             <a:endParaRPr lang="en-US"/>
           </a:p>
@@ -6146,7 +6142,7 @@
           <a:p>
             <a:fld id="{3F135061-2F74-46D4-9F8F-C77EF304855D}" type="datetimeFigureOut">
               <a:rPr lang="en-US" smtClean="0"/>
-              <a:t>3/28/2025</a:t>
+              <a:t>4/1/2025</a:t>
             </a:fld>
             <a:endParaRPr lang="en-US"/>
           </a:p>
@@ -6359,7 +6355,7 @@
           <a:p>
             <a:fld id="{3F135061-2F74-46D4-9F8F-C77EF304855D}" type="datetimeFigureOut">
               <a:rPr lang="en-US" smtClean="0"/>
-              <a:t>3/28/2025</a:t>
+              <a:t>4/1/2025</a:t>
             </a:fld>
             <a:endParaRPr lang="en-US"/>
           </a:p>
@@ -6915,8 +6911,8 @@
         </p:nvSpPr>
         <p:spPr>
           <a:xfrm>
-            <a:off x="12716429" y="1416670"/>
-            <a:ext cx="25976634" cy="10767172"/>
+            <a:off x="12110008" y="1430987"/>
+            <a:ext cx="26765304" cy="10767172"/>
           </a:xfrm>
         </p:spPr>
         <p:txBody>
@@ -6939,7 +6935,7 @@
                 <a:ea typeface="Segoe UI Black" panose="020B0A02040204020203" pitchFamily="34" charset="0"/>
                 <a:cs typeface="Segoe UI" panose="020B0502040204020203" pitchFamily="34" charset="0"/>
               </a:rPr>
-              <a:t>The 2023 Credit Suisse banking collapse could have been prevented</a:t>
+              <a:t>The 2023 Credit Suisse banking collapse would have been mitigated</a:t>
             </a:r>
             <a:r>
               <a:rPr lang="en-US" sz="12500" dirty="0">
@@ -6950,7 +6946,7 @@
                 <a:ea typeface="Roboto" panose="02000000000000000000" pitchFamily="2" charset="0"/>
                 <a:cs typeface="Segoe UI" panose="020B0502040204020203" pitchFamily="34" charset="0"/>
               </a:rPr>
-              <a:t> by applying a </a:t>
+              <a:t> if it had applied a </a:t>
             </a:r>
             <a:r>
               <a:rPr lang="en-US" sz="12500" b="1" dirty="0">
@@ -6992,7 +6988,7 @@
         <p:spPr>
           <a:xfrm>
             <a:off x="1144918" y="7818771"/>
-            <a:ext cx="9563989" cy="22487374"/>
+            <a:ext cx="9563989" cy="24260167"/>
           </a:xfrm>
           <a:prstGeom prst="rect">
             <a:avLst/>
@@ -7156,6 +7152,36 @@
                 <a:cs typeface="Segoe UI" panose="020B0502040204020203" pitchFamily="34" charset="0"/>
               </a:rPr>
               <a:t>Simulated results of adding Dynamic Control of Leverage (DCL) dynamics to the AT1 debt.</a:t>
+            </a:r>
+          </a:p>
+          <a:p>
+            <a:pPr marL="742950" indent="-742950">
+              <a:lnSpc>
+                <a:spcPct val="120000"/>
+              </a:lnSpc>
+              <a:buFont typeface="+mj-lt"/>
+              <a:buAutoNum type="arabicPeriod"/>
+            </a:pPr>
+            <a:r>
+              <a:rPr lang="en-US" sz="3200" dirty="0">
+                <a:latin typeface="Lato" panose="020F0502020204030203" pitchFamily="34" charset="0"/>
+                <a:cs typeface="Segoe UI" panose="020B0502040204020203" pitchFamily="34" charset="0"/>
+              </a:rPr>
+              <a:t>Interpret the results (leverage adjustments, shareholder dilution, additional share issuances, </a:t>
+            </a:r>
+            <a:r>
+              <a:rPr lang="en-US" sz="3200" dirty="0" err="1">
+                <a:latin typeface="Lato" panose="020F0502020204030203" pitchFamily="34" charset="0"/>
+                <a:cs typeface="Segoe UI" panose="020B0502040204020203" pitchFamily="34" charset="0"/>
+              </a:rPr>
+              <a:t>etc</a:t>
+            </a:r>
+            <a:r>
+              <a:rPr lang="en-US" sz="3200" dirty="0">
+                <a:latin typeface="Lato" panose="020F0502020204030203" pitchFamily="34" charset="0"/>
+                <a:cs typeface="Segoe UI" panose="020B0502040204020203" pitchFamily="34" charset="0"/>
+              </a:rPr>
+              <a:t>…)</a:t>
             </a:r>
           </a:p>
           <a:p>
@@ -8555,13 +8581,13 @@
           <p:nvPr>
             <p:extLst>
               <p:ext uri="{D42A27DB-BD31-4B8C-83A1-F6EECF244321}">
-                <p14:modId xmlns:p14="http://schemas.microsoft.com/office/powerpoint/2010/main" val="894634320"/>
+                <p14:modId xmlns:p14="http://schemas.microsoft.com/office/powerpoint/2010/main" val="2957856308"/>
               </p:ext>
             </p:extLst>
           </p:nvPr>
         </p:nvGraphicFramePr>
         <p:xfrm>
-          <a:off x="1001973" y="18799361"/>
+          <a:off x="1001973" y="20497810"/>
           <a:ext cx="9563989" cy="4037061"/>
         </p:xfrm>
         <a:graphic>

</xml_diff>

<commit_message>
Added simulations for SVB, LEHMAN, DEUTSCHE BANK
</commit_message>
<xml_diff>
--- a/poster.pptx
+++ b/poster.pptx
@@ -1677,7 +1677,7 @@
   <dgm:whole/>
   <dgm:extLst>
     <a:ext uri="http://schemas.microsoft.com/office/drawing/2008/diagram">
-      <dsp:dataModelExt xmlns:dsp="http://schemas.microsoft.com/office/drawing/2008/diagram" relId="rId12" minVer="http://schemas.openxmlformats.org/drawingml/2006/diagram"/>
+      <dsp:dataModelExt xmlns:dsp="http://schemas.microsoft.com/office/drawing/2008/diagram" relId="rId11" minVer="http://schemas.openxmlformats.org/drawingml/2006/diagram"/>
     </a:ext>
   </dgm:extLst>
 </dgm:dataModel>
@@ -8452,42 +8452,6 @@
       </p:pic>
       <p:pic>
         <p:nvPicPr>
-          <p:cNvPr id="31" name="Picture 30" descr="A graph of a credit suisse&#10;&#10;AI-generated content may be incorrect.">
-            <a:extLst>
-              <a:ext uri="{FF2B5EF4-FFF2-40B4-BE49-F238E27FC236}">
-                <a16:creationId xmlns:a16="http://schemas.microsoft.com/office/drawing/2014/main" id="{DE459FF0-F33C-F2C5-94B1-EE5A6BFE85ED}"/>
-              </a:ext>
-            </a:extLst>
-          </p:cNvPr>
-          <p:cNvPicPr>
-            <a:picLocks noChangeAspect="1"/>
-          </p:cNvPicPr>
-          <p:nvPr/>
-        </p:nvPicPr>
-        <p:blipFill>
-          <a:blip r:embed="rId5">
-            <a:extLst>
-              <a:ext uri="{28A0092B-C50C-407E-A947-70E740481C1C}">
-                <a14:useLocalDpi xmlns:a14="http://schemas.microsoft.com/office/drawing/2010/main" val="0"/>
-              </a:ext>
-            </a:extLst>
-          </a:blip>
-          <a:stretch>
-            <a:fillRect/>
-          </a:stretch>
-        </p:blipFill>
-        <p:spPr>
-          <a:xfrm>
-            <a:off x="14982895" y="12249319"/>
-            <a:ext cx="19988251" cy="11992951"/>
-          </a:xfrm>
-          <a:prstGeom prst="rect">
-            <a:avLst/>
-          </a:prstGeom>
-        </p:spPr>
-      </p:pic>
-      <p:pic>
-        <p:nvPicPr>
           <p:cNvPr id="33" name="Picture 32" descr="A person in a suit and bow tie&#10;&#10;AI-generated content may be incorrect.">
             <a:extLst>
               <a:ext uri="{FF2B5EF4-FFF2-40B4-BE49-F238E27FC236}">
@@ -8501,7 +8465,7 @@
           <p:nvPr/>
         </p:nvPicPr>
         <p:blipFill>
-          <a:blip r:embed="rId6">
+          <a:blip r:embed="rId5">
             <a:extLst>
               <a:ext uri="{28A0092B-C50C-407E-A947-70E740481C1C}">
                 <a14:useLocalDpi xmlns:a14="http://schemas.microsoft.com/office/drawing/2010/main" val="0"/>
@@ -8536,7 +8500,7 @@
           <p:nvPr/>
         </p:nvPicPr>
         <p:blipFill>
-          <a:blip r:embed="rId7">
+          <a:blip r:embed="rId6">
             <a:extLst>
               <a:ext uri="{28A0092B-C50C-407E-A947-70E740481C1C}">
                 <a14:useLocalDpi xmlns:a14="http://schemas.microsoft.com/office/drawing/2010/main" val="0"/>
@@ -8592,7 +8556,7 @@
         </p:xfrm>
         <a:graphic>
           <a:graphicData uri="http://schemas.openxmlformats.org/drawingml/2006/diagram">
-            <dgm:relIds xmlns:dgm="http://schemas.openxmlformats.org/drawingml/2006/diagram" xmlns:r="http://schemas.openxmlformats.org/officeDocument/2006/relationships" r:dm="rId8" r:lo="rId9" r:qs="rId10" r:cs="rId11"/>
+            <dgm:relIds xmlns:dgm="http://schemas.openxmlformats.org/drawingml/2006/diagram" xmlns:r="http://schemas.openxmlformats.org/officeDocument/2006/relationships" r:dm="rId7" r:lo="rId8" r:qs="rId9" r:cs="rId10"/>
           </a:graphicData>
         </a:graphic>
       </p:graphicFrame>
@@ -8611,7 +8575,7 @@
           <p:nvPr/>
         </p:nvPicPr>
         <p:blipFill>
-          <a:blip r:embed="rId13">
+          <a:blip r:embed="rId12">
             <a:extLst>
               <a:ext uri="{28A0092B-C50C-407E-A947-70E740481C1C}">
                 <a14:useLocalDpi xmlns:a14="http://schemas.microsoft.com/office/drawing/2010/main" val="0"/>
@@ -8624,8 +8588,8 @@
         </p:blipFill>
         <p:spPr>
           <a:xfrm>
-            <a:off x="1001973" y="25838249"/>
-            <a:ext cx="9144018" cy="5486411"/>
+            <a:off x="13744203" y="11592793"/>
+            <a:ext cx="11400000" cy="6840000"/>
           </a:xfrm>
           <a:prstGeom prst="rect">
             <a:avLst/>
@@ -8851,7 +8815,7 @@
           <p:nvPr/>
         </p:nvPicPr>
         <p:blipFill>
-          <a:blip r:embed="rId14">
+          <a:blip r:embed="rId13">
             <a:extLst>
               <a:ext uri="{28A0092B-C50C-407E-A947-70E740481C1C}">
                 <a14:useLocalDpi xmlns:a14="http://schemas.microsoft.com/office/drawing/2010/main" val="0"/>
@@ -8887,7 +8851,7 @@
           <p:nvPr/>
         </p:nvPicPr>
         <p:blipFill>
-          <a:blip r:embed="rId15">
+          <a:blip r:embed="rId14">
             <a:extLst>
               <a:ext uri="{28A0092B-C50C-407E-A947-70E740481C1C}">
                 <a14:useLocalDpi xmlns:a14="http://schemas.microsoft.com/office/drawing/2010/main" val="0"/>
@@ -8986,6 +8950,114 @@
           </a:p>
         </p:txBody>
       </p:sp>
+      <p:pic>
+        <p:nvPicPr>
+          <p:cNvPr id="4" name="Picture 3" descr="A graph with a blue line&#10;&#10;AI-generated content may be incorrect.">
+            <a:extLst>
+              <a:ext uri="{FF2B5EF4-FFF2-40B4-BE49-F238E27FC236}">
+                <a16:creationId xmlns:a16="http://schemas.microsoft.com/office/drawing/2014/main" id="{40953B21-B583-8670-4836-D1E112A850EB}"/>
+              </a:ext>
+            </a:extLst>
+          </p:cNvPr>
+          <p:cNvPicPr>
+            <a:picLocks noChangeAspect="1"/>
+          </p:cNvPicPr>
+          <p:nvPr/>
+        </p:nvPicPr>
+        <p:blipFill>
+          <a:blip r:embed="rId15">
+            <a:extLst>
+              <a:ext uri="{28A0092B-C50C-407E-A947-70E740481C1C}">
+                <a14:useLocalDpi xmlns:a14="http://schemas.microsoft.com/office/drawing/2010/main" val="0"/>
+              </a:ext>
+            </a:extLst>
+          </a:blip>
+          <a:stretch>
+            <a:fillRect/>
+          </a:stretch>
+        </p:blipFill>
+        <p:spPr>
+          <a:xfrm>
+            <a:off x="13744203" y="19059101"/>
+            <a:ext cx="11429694" cy="6840000"/>
+          </a:xfrm>
+          <a:prstGeom prst="rect">
+            <a:avLst/>
+          </a:prstGeom>
+        </p:spPr>
+      </p:pic>
+      <p:pic>
+        <p:nvPicPr>
+          <p:cNvPr id="7" name="Picture 6" descr="A graph of a graph&#10;&#10;AI-generated content may be incorrect.">
+            <a:extLst>
+              <a:ext uri="{FF2B5EF4-FFF2-40B4-BE49-F238E27FC236}">
+                <a16:creationId xmlns:a16="http://schemas.microsoft.com/office/drawing/2014/main" id="{8F3ADD30-CDC2-5E6F-BA34-00213740AE56}"/>
+              </a:ext>
+            </a:extLst>
+          </p:cNvPr>
+          <p:cNvPicPr>
+            <a:picLocks noChangeAspect="1"/>
+          </p:cNvPicPr>
+          <p:nvPr/>
+        </p:nvPicPr>
+        <p:blipFill>
+          <a:blip r:embed="rId16">
+            <a:extLst>
+              <a:ext uri="{28A0092B-C50C-407E-A947-70E740481C1C}">
+                <a14:useLocalDpi xmlns:a14="http://schemas.microsoft.com/office/drawing/2010/main" val="0"/>
+              </a:ext>
+            </a:extLst>
+          </a:blip>
+          <a:stretch>
+            <a:fillRect/>
+          </a:stretch>
+        </p:blipFill>
+        <p:spPr>
+          <a:xfrm>
+            <a:off x="25902245" y="18955959"/>
+            <a:ext cx="11400000" cy="6840000"/>
+          </a:xfrm>
+          <a:prstGeom prst="rect">
+            <a:avLst/>
+          </a:prstGeom>
+        </p:spPr>
+      </p:pic>
+      <p:pic>
+        <p:nvPicPr>
+          <p:cNvPr id="10" name="Picture 9" descr="A graph of a graph showing different frequency&#10;&#10;AI-generated content may be incorrect.">
+            <a:extLst>
+              <a:ext uri="{FF2B5EF4-FFF2-40B4-BE49-F238E27FC236}">
+                <a16:creationId xmlns:a16="http://schemas.microsoft.com/office/drawing/2014/main" id="{0246F7CB-EF6E-6AC5-1FD2-97889DA197B4}"/>
+              </a:ext>
+            </a:extLst>
+          </p:cNvPr>
+          <p:cNvPicPr>
+            <a:picLocks noChangeAspect="1"/>
+          </p:cNvPicPr>
+          <p:nvPr/>
+        </p:nvPicPr>
+        <p:blipFill>
+          <a:blip r:embed="rId17">
+            <a:extLst>
+              <a:ext uri="{28A0092B-C50C-407E-A947-70E740481C1C}">
+                <a14:useLocalDpi xmlns:a14="http://schemas.microsoft.com/office/drawing/2010/main" val="0"/>
+              </a:ext>
+            </a:extLst>
+          </a:blip>
+          <a:stretch>
+            <a:fillRect/>
+          </a:stretch>
+        </p:blipFill>
+        <p:spPr>
+          <a:xfrm>
+            <a:off x="25902246" y="11592793"/>
+            <a:ext cx="11399999" cy="6840000"/>
+          </a:xfrm>
+          <a:prstGeom prst="rect">
+            <a:avLst/>
+          </a:prstGeom>
+        </p:spPr>
+      </p:pic>
     </p:spTree>
     <p:extLst>
       <p:ext uri="{BB962C8B-B14F-4D97-AF65-F5344CB8AC3E}">

</xml_diff>